<commit_message>
Temporariamente foi criado o modelo de acesso biometrico, criado no admin um class para visualizacao e filtros do acesso, criado um form para ajudar o cliente na hora de cadastra o acesso junto com um arquivo .js, uma url e uma funcao na view.  O modelo esta ok, o form com o arquivo .js ainda precisa ser trabalhado com Leonardo, a view esta com um erro pra corrigir.
</commit_message>
<xml_diff>
--- a/Projeto SysTI/002-Acompanhamento /it02/PIT-Plano de Iteracao 2.pptx
+++ b/Projeto SysTI/002-Acompanhamento /it02/PIT-Plano de Iteracao 2.pptx
@@ -3001,8 +3001,8 @@
         </p:nvSpPr>
         <p:spPr>
           <a:xfrm>
-            <a:off x="457200" y="274680"/>
-            <a:ext cx="8228880" cy="1142280"/>
+            <a:off x="457200" y="273600"/>
+            <a:ext cx="8228880" cy="1144440"/>
           </a:xfrm>
           <a:prstGeom prst="rect">
             <a:avLst/>
@@ -3039,7 +3039,7 @@
         <p:spPr>
           <a:xfrm>
             <a:off x="457200" y="1604520"/>
-            <a:ext cx="8229240" cy="3977280"/>
+            <a:ext cx="8228880" cy="3976920"/>
           </a:xfrm>
           <a:prstGeom prst="rect">
             <a:avLst/>
@@ -3057,7 +3057,7 @@
               <a:buChar char=""/>
             </a:pPr>
             <a:r>
-              <a:rPr b="0" lang="pt-BR" sz="3200" spc="-1" strike="noStrike">
+              <a:rPr b="0" lang="pt-BR" sz="1800" spc="-1" strike="noStrike">
                 <a:solidFill>
                   <a:srgbClr val="000000"/>
                 </a:solidFill>
@@ -3070,7 +3070,7 @@
               </a:rPr>
               <a:t>Clique para editar o formato do texto da estrutura de tópicos</a:t>
             </a:r>
-            <a:endParaRPr b="0" lang="pt-BR" sz="3200" spc="-1" strike="noStrike">
+            <a:endParaRPr b="0" lang="pt-BR" sz="1800" spc="-1" strike="noStrike">
               <a:solidFill>
                 <a:srgbClr val="000000"/>
               </a:solidFill>
@@ -3092,7 +3092,7 @@
               <a:buChar char=""/>
             </a:pPr>
             <a:r>
-              <a:rPr b="0" lang="pt-BR" sz="2800" spc="-1" strike="noStrike">
+              <a:rPr b="0" lang="pt-BR" sz="1800" spc="-1" strike="noStrike">
                 <a:solidFill>
                   <a:srgbClr val="000000"/>
                 </a:solidFill>
@@ -3105,7 +3105,7 @@
               </a:rPr>
               <a:t>2.º nível da estrutura de tópicos</a:t>
             </a:r>
-            <a:endParaRPr b="0" lang="pt-BR" sz="2800" spc="-1" strike="noStrike">
+            <a:endParaRPr b="0" lang="pt-BR" sz="1800" spc="-1" strike="noStrike">
               <a:solidFill>
                 <a:srgbClr val="000000"/>
               </a:solidFill>
@@ -3127,7 +3127,7 @@
               <a:buChar char=""/>
             </a:pPr>
             <a:r>
-              <a:rPr b="0" lang="pt-BR" sz="2400" spc="-1" strike="noStrike">
+              <a:rPr b="0" lang="pt-BR" sz="1800" spc="-1" strike="noStrike">
                 <a:solidFill>
                   <a:srgbClr val="000000"/>
                 </a:solidFill>
@@ -3140,7 +3140,7 @@
               </a:rPr>
               <a:t>3.º nível da estrutura de tópicos</a:t>
             </a:r>
-            <a:endParaRPr b="0" lang="pt-BR" sz="2400" spc="-1" strike="noStrike">
+            <a:endParaRPr b="0" lang="pt-BR" sz="1800" spc="-1" strike="noStrike">
               <a:solidFill>
                 <a:srgbClr val="000000"/>
               </a:solidFill>
@@ -3162,7 +3162,7 @@
               <a:buChar char=""/>
             </a:pPr>
             <a:r>
-              <a:rPr b="0" lang="pt-BR" sz="2000" spc="-1" strike="noStrike">
+              <a:rPr b="0" lang="pt-BR" sz="1800" spc="-1" strike="noStrike">
                 <a:solidFill>
                   <a:srgbClr val="000000"/>
                 </a:solidFill>
@@ -3175,7 +3175,7 @@
               </a:rPr>
               <a:t>4.º nível da estrutura de tópicos</a:t>
             </a:r>
-            <a:endParaRPr b="0" lang="pt-BR" sz="2000" spc="-1" strike="noStrike">
+            <a:endParaRPr b="0" lang="pt-BR" sz="1800" spc="-1" strike="noStrike">
               <a:solidFill>
                 <a:srgbClr val="000000"/>
               </a:solidFill>
@@ -3197,7 +3197,7 @@
               <a:buChar char=""/>
             </a:pPr>
             <a:r>
-              <a:rPr b="0" lang="pt-BR" sz="2000" spc="-1" strike="noStrike">
+              <a:rPr b="0" lang="pt-BR" sz="1800" spc="-1" strike="noStrike">
                 <a:solidFill>
                   <a:srgbClr val="000000"/>
                 </a:solidFill>
@@ -3210,7 +3210,7 @@
               </a:rPr>
               <a:t>5.º nível da estrutura de tópicos</a:t>
             </a:r>
-            <a:endParaRPr b="0" lang="pt-BR" sz="2000" spc="-1" strike="noStrike">
+            <a:endParaRPr b="0" lang="pt-BR" sz="1800" spc="-1" strike="noStrike">
               <a:solidFill>
                 <a:srgbClr val="000000"/>
               </a:solidFill>
@@ -3232,7 +3232,7 @@
               <a:buChar char=""/>
             </a:pPr>
             <a:r>
-              <a:rPr b="0" lang="pt-BR" sz="2000" spc="-1" strike="noStrike">
+              <a:rPr b="0" lang="pt-BR" sz="1800" spc="-1" strike="noStrike">
                 <a:solidFill>
                   <a:srgbClr val="000000"/>
                 </a:solidFill>
@@ -3245,7 +3245,7 @@
               </a:rPr>
               <a:t>6.º nível da estrutura de tópicos</a:t>
             </a:r>
-            <a:endParaRPr b="0" lang="pt-BR" sz="2000" spc="-1" strike="noStrike">
+            <a:endParaRPr b="0" lang="pt-BR" sz="1800" spc="-1" strike="noStrike">
               <a:solidFill>
                 <a:srgbClr val="000000"/>
               </a:solidFill>
@@ -3267,7 +3267,7 @@
               <a:buChar char=""/>
             </a:pPr>
             <a:r>
-              <a:rPr b="0" lang="pt-BR" sz="2000" spc="-1" strike="noStrike">
+              <a:rPr b="0" lang="pt-BR" sz="1800" spc="-1" strike="noStrike">
                 <a:solidFill>
                   <a:srgbClr val="000000"/>
                 </a:solidFill>
@@ -3280,7 +3280,7 @@
               </a:rPr>
               <a:t>7.º nível da estrutura de tópicos</a:t>
             </a:r>
-            <a:endParaRPr b="0" lang="pt-BR" sz="2000" spc="-1" strike="noStrike">
+            <a:endParaRPr b="0" lang="pt-BR" sz="1800" spc="-1" strike="noStrike">
               <a:solidFill>
                 <a:srgbClr val="000000"/>
               </a:solidFill>
@@ -3703,7 +3703,7 @@
         <p:spPr>
           <a:xfrm>
             <a:off x="685800" y="2130480"/>
-            <a:ext cx="7771680" cy="1469160"/>
+            <a:ext cx="7771320" cy="1468800"/>
           </a:xfrm>
           <a:prstGeom prst="rect">
             <a:avLst/>
@@ -3733,6 +3733,7 @@
                   </a:solidFill>
                 </a:uFill>
                 <a:latin typeface="Calibri"/>
+                <a:ea typeface="DejaVu Sans"/>
               </a:rPr>
               <a:t>SysTI</a:t>
             </a:r>
@@ -3760,6 +3761,7 @@
                   </a:solidFill>
                 </a:uFill>
                 <a:latin typeface="Calibri"/>
+                <a:ea typeface="DejaVu Sans"/>
               </a:rPr>
               <a:t>Sistema de Gestão de TI</a:t>
             </a:r>
@@ -3792,6 +3794,7 @@
                   </a:solidFill>
                 </a:uFill>
                 <a:latin typeface="Calibri"/>
+                <a:ea typeface="DejaVu Sans"/>
               </a:rPr>
               <a:t>Plano de Iteração</a:t>
             </a:r>
@@ -3818,7 +3821,7 @@
         <p:spPr>
           <a:xfrm>
             <a:off x="1371600" y="3886200"/>
-            <a:ext cx="6400080" cy="1751760"/>
+            <a:ext cx="6399720" cy="1751400"/>
           </a:xfrm>
           <a:prstGeom prst="rect">
             <a:avLst/>
@@ -3853,8 +3856,9 @@
                   </a:solidFill>
                 </a:uFill>
                 <a:latin typeface="Calibri"/>
+                <a:ea typeface="DejaVu Sans"/>
               </a:rPr>
-              <a:t>Iteração 1</a:t>
+              <a:t>Iteração 2</a:t>
             </a:r>
             <a:endParaRPr b="0" lang="pt-BR" sz="1800" spc="-1" strike="noStrike">
               <a:solidFill>
@@ -3928,7 +3932,7 @@
         <p:spPr>
           <a:xfrm>
             <a:off x="457200" y="274680"/>
-            <a:ext cx="8228880" cy="1142280"/>
+            <a:ext cx="8228520" cy="1141920"/>
           </a:xfrm>
           <a:prstGeom prst="rect">
             <a:avLst/>
@@ -3963,6 +3967,7 @@
                   </a:solidFill>
                 </a:uFill>
                 <a:latin typeface="Calibri"/>
+                <a:ea typeface="DejaVu Sans"/>
               </a:rPr>
               <a:t>Agenda</a:t>
             </a:r>
@@ -3989,7 +3994,7 @@
         <p:spPr>
           <a:xfrm>
             <a:off x="457200" y="1600200"/>
-            <a:ext cx="8228880" cy="4525200"/>
+            <a:ext cx="8228520" cy="4524840"/>
           </a:xfrm>
           <a:prstGeom prst="rect">
             <a:avLst/>
@@ -4008,7 +4013,7 @@
         <p:txBody>
           <a:bodyPr lIns="90000" rIns="90000" tIns="45000" bIns="45000"/>
           <a:p>
-            <a:pPr marL="343080" indent="-342360">
+            <a:pPr marL="343080" indent="-342000">
               <a:lnSpc>
                 <a:spcPct val="100000"/>
               </a:lnSpc>
@@ -4029,6 +4034,7 @@
                   </a:solidFill>
                 </a:uFill>
                 <a:latin typeface="Calibri"/>
+                <a:ea typeface="DejaVu Sans"/>
               </a:rPr>
               <a:t>Objetivos da Iteração</a:t>
             </a:r>
@@ -4045,7 +4051,7 @@
             </a:endParaRPr>
           </a:p>
           <a:p>
-            <a:pPr marL="343080" indent="-342360">
+            <a:pPr marL="343080" indent="-342000">
               <a:lnSpc>
                 <a:spcPct val="100000"/>
               </a:lnSpc>
@@ -4066,6 +4072,7 @@
                   </a:solidFill>
                 </a:uFill>
                 <a:latin typeface="Calibri"/>
+                <a:ea typeface="DejaVu Sans"/>
               </a:rPr>
               <a:t>Itens de backlog da Iteração</a:t>
             </a:r>
@@ -4082,7 +4089,7 @@
             </a:endParaRPr>
           </a:p>
           <a:p>
-            <a:pPr marL="343080" indent="-342360">
+            <a:pPr marL="343080" indent="-342000">
               <a:lnSpc>
                 <a:spcPct val="100000"/>
               </a:lnSpc>
@@ -4103,6 +4110,7 @@
                   </a:solidFill>
                 </a:uFill>
                 <a:latin typeface="Calibri"/>
+                <a:ea typeface="DejaVu Sans"/>
               </a:rPr>
               <a:t>Timeline da Iteração</a:t>
             </a:r>
@@ -4196,7 +4204,7 @@
         <p:spPr>
           <a:xfrm>
             <a:off x="457200" y="274680"/>
-            <a:ext cx="8228880" cy="1142280"/>
+            <a:ext cx="8228520" cy="1141920"/>
           </a:xfrm>
           <a:prstGeom prst="rect">
             <a:avLst/>
@@ -4231,6 +4239,7 @@
                   </a:solidFill>
                 </a:uFill>
                 <a:latin typeface="Calibri"/>
+                <a:ea typeface="DejaVu Sans"/>
               </a:rPr>
               <a:t>Objetivos da Iteração</a:t>
             </a:r>
@@ -4257,7 +4266,7 @@
         <p:spPr>
           <a:xfrm>
             <a:off x="457200" y="1600200"/>
-            <a:ext cx="8228880" cy="4525200"/>
+            <a:ext cx="8228520" cy="4524840"/>
           </a:xfrm>
           <a:prstGeom prst="rect">
             <a:avLst/>
@@ -4276,7 +4285,7 @@
         <p:txBody>
           <a:bodyPr lIns="90000" rIns="90000" tIns="45000" bIns="45000"/>
           <a:p>
-            <a:pPr marL="343080" indent="-342360" algn="just">
+            <a:pPr marL="343080" indent="-342000" algn="just">
               <a:lnSpc>
                 <a:spcPct val="100000"/>
               </a:lnSpc>
@@ -4297,8 +4306,47 @@
                   </a:solidFill>
                 </a:uFill>
                 <a:latin typeface="Calibri"/>
+                <a:ea typeface="DejaVu Sans"/>
               </a:rPr>
-              <a:t>Um dos desenvolvedores deverá desenvolver módulo onde os usuários do sistemas possam gerenciar os ativos de TI, enquanto que o outro devera aprender o framework Django e os padrões de design do suap.</a:t>
+              <a:t>Terminar o desenvolvimento do requisito Gerenciar ativo. </a:t>
+            </a:r>
+            <a:endParaRPr b="0" lang="pt-BR" sz="1800" spc="-1" strike="noStrike">
+              <a:solidFill>
+                <a:srgbClr val="000000"/>
+              </a:solidFill>
+              <a:uFill>
+                <a:solidFill>
+                  <a:srgbClr val="ffffff"/>
+                </a:solidFill>
+              </a:uFill>
+              <a:latin typeface="Arial"/>
+            </a:endParaRPr>
+          </a:p>
+          <a:p>
+            <a:pPr marL="343080" indent="-342000" algn="just">
+              <a:lnSpc>
+                <a:spcPct val="100000"/>
+              </a:lnSpc>
+              <a:buClr>
+                <a:srgbClr val="000000"/>
+              </a:buClr>
+              <a:buFont typeface="Arial"/>
+              <a:buChar char="•"/>
+            </a:pPr>
+            <a:r>
+              <a:rPr b="0" lang="pt-BR" sz="3200" spc="-1" strike="noStrike">
+                <a:solidFill>
+                  <a:srgbClr val="000000"/>
+                </a:solidFill>
+                <a:uFill>
+                  <a:solidFill>
+                    <a:srgbClr val="ffffff"/>
+                  </a:solidFill>
+                </a:uFill>
+                <a:latin typeface="Calibri"/>
+                <a:ea typeface="DejaVu Sans"/>
+              </a:rPr>
+              <a:t>Desenvolver os requisitos de Gerenciar registro de cadastros das portas biometricas e Gerenciar materiais para serviços de TI.</a:t>
             </a:r>
             <a:endParaRPr b="0" lang="pt-BR" sz="1800" spc="-1" strike="noStrike">
               <a:solidFill>
@@ -4372,7 +4420,7 @@
         <p:spPr>
           <a:xfrm>
             <a:off x="457200" y="274680"/>
-            <a:ext cx="8228880" cy="1142280"/>
+            <a:ext cx="8228520" cy="1141920"/>
           </a:xfrm>
           <a:prstGeom prst="rect">
             <a:avLst/>
@@ -4407,6 +4455,7 @@
                   </a:solidFill>
                 </a:uFill>
                 <a:latin typeface="Calibri"/>
+                <a:ea typeface="DejaVu Sans"/>
               </a:rPr>
               <a:t>Itens de Backlog da Iteração</a:t>
             </a:r>
@@ -4575,11 +4624,11 @@
                     <a:p>
                       <a:pPr>
                         <a:lnSpc>
-                          <a:spcPct val="115000"/>
+                          <a:spcPct val="100000"/>
                         </a:lnSpc>
                       </a:pPr>
                       <a:r>
-                        <a:rPr b="0" lang="pt-BR" sz="1600" spc="-1" strike="noStrike">
+                        <a:rPr b="0" lang="pt-BR" sz="1400" spc="-1" strike="noStrike">
                           <a:solidFill>
                             <a:srgbClr val="000000"/>
                           </a:solidFill>
@@ -4588,12 +4637,12 @@
                               <a:srgbClr val="ffffff"/>
                             </a:solidFill>
                           </a:uFill>
-                          <a:latin typeface="Calibri"/>
-                          <a:ea typeface="Arial Narrow"/>
+                          <a:latin typeface="Arial"/>
+                          <a:ea typeface="DejaVu Sans"/>
                         </a:rPr>
-                        <a:t>Gerenciamento de Ativos</a:t>
+                        <a:t>Gerenciar registro de cadastro nas portas biométricas</a:t>
                       </a:r>
-                      <a:endParaRPr b="0" lang="pt-BR" sz="1800" spc="-1" strike="noStrike">
+                      <a:endParaRPr b="0" lang="pt-BR" sz="1400" spc="-1" strike="noStrike">
                         <a:solidFill>
                           <a:srgbClr val="000000"/>
                         </a:solidFill>
@@ -4636,11 +4685,6 @@
                   <a:txBody>
                     <a:bodyPr/>
                     <a:p>
-                      <a:pPr>
-                        <a:lnSpc>
-                          <a:spcPct val="100000"/>
-                        </a:lnSpc>
-                      </a:pPr>
                       <a:r>
                         <a:rPr b="0" lang="pt-BR" sz="2400" spc="-1" strike="noStrike">
                           <a:solidFill>
@@ -4651,11 +4695,11 @@
                               <a:srgbClr val="ffffff"/>
                             </a:solidFill>
                           </a:uFill>
-                          <a:latin typeface="Calibri"/>
+                          <a:latin typeface="Times New Roman"/>
                         </a:rPr>
-                        <a:t>?</a:t>
+                        <a:t>3</a:t>
                       </a:r>
-                      <a:endParaRPr b="0" lang="pt-BR" sz="1800" spc="-1" strike="noStrike">
+                      <a:endParaRPr b="0" lang="pt-BR" sz="2400" spc="-1" strike="noStrike">
                         <a:solidFill>
                           <a:srgbClr val="000000"/>
                         </a:solidFill>
@@ -4664,7 +4708,7 @@
                             <a:srgbClr val="ffffff"/>
                           </a:solidFill>
                         </a:uFill>
-                        <a:latin typeface="Arial"/>
+                        <a:latin typeface="Times New Roman"/>
                       </a:endParaRPr>
                     </a:p>
                   </a:txBody>
@@ -4702,11 +4746,11 @@
                     <a:p>
                       <a:pPr>
                         <a:lnSpc>
-                          <a:spcPct val="115000"/>
+                          <a:spcPct val="100000"/>
                         </a:lnSpc>
                       </a:pPr>
                       <a:r>
-                        <a:rPr b="0" lang="pt-BR" sz="1600" spc="-1" strike="noStrike">
+                        <a:rPr b="0" lang="pt-BR" sz="1400" spc="-1" strike="noStrike">
                           <a:solidFill>
                             <a:srgbClr val="000000"/>
                           </a:solidFill>
@@ -4715,12 +4759,12 @@
                               <a:srgbClr val="ffffff"/>
                             </a:solidFill>
                           </a:uFill>
-                          <a:latin typeface="Calibri"/>
-                          <a:ea typeface="Arial Narrow"/>
+                          <a:latin typeface="Arial"/>
+                          <a:ea typeface="DejaVu Sans"/>
                         </a:rPr>
-                        <a:t>Gerenciamento de fornecedores</a:t>
+                        <a:t>Gerenciamento de Materiais para Serviços de TI</a:t>
                       </a:r>
-                      <a:endParaRPr b="0" lang="pt-BR" sz="1800" spc="-1" strike="noStrike">
+                      <a:endParaRPr b="0" lang="pt-BR" sz="1400" spc="-1" strike="noStrike">
                         <a:solidFill>
                           <a:srgbClr val="000000"/>
                         </a:solidFill>
@@ -4775,9 +4819,9 @@
                           </a:uFill>
                           <a:latin typeface="Times New Roman"/>
                         </a:rPr>
-                        <a:t>1</a:t>
+                        <a:t>3</a:t>
                       </a:r>
-                      <a:endParaRPr b="0" lang="pt-BR" sz="1800" spc="-1" strike="noStrike">
+                      <a:endParaRPr b="0" lang="pt-BR" sz="2400" spc="-1" strike="noStrike">
                         <a:solidFill>
                           <a:srgbClr val="000000"/>
                         </a:solidFill>
@@ -4786,7 +4830,7 @@
                             <a:srgbClr val="ffffff"/>
                           </a:solidFill>
                         </a:uFill>
-                        <a:latin typeface="Arial"/>
+                        <a:latin typeface="Times New Roman"/>
                       </a:endParaRPr>
                     </a:p>
                   </a:txBody>
@@ -4935,7 +4979,7 @@
         <p:spPr>
           <a:xfrm>
             <a:off x="457200" y="274680"/>
-            <a:ext cx="8228880" cy="1142280"/>
+            <a:ext cx="8228520" cy="1141920"/>
           </a:xfrm>
           <a:prstGeom prst="rect">
             <a:avLst/>
@@ -4970,6 +5014,7 @@
                   </a:solidFill>
                 </a:uFill>
                 <a:latin typeface="Calibri"/>
+                <a:ea typeface="DejaVu Sans"/>
               </a:rPr>
               <a:t>Timeline da Iteração</a:t>
             </a:r>
@@ -5000,7 +5045,7 @@
         <p:spPr>
           <a:xfrm>
             <a:off x="222120" y="2257560"/>
-            <a:ext cx="8921160" cy="2953080"/>
+            <a:ext cx="8920800" cy="2952720"/>
           </a:xfrm>
           <a:prstGeom prst="rect">
             <a:avLst/>

</xml_diff>